<commit_message>
Maj plan de salle et suppression d'un thisworbook corrompu
</commit_message>
<xml_diff>
--- a/Plan Salle/plan pièce composant.pptx
+++ b/Plan Salle/plan pièce composant.pptx
@@ -259,7 +259,7 @@
           <a:p>
             <a:fld id="{4DF2D56A-9BCB-4C61-93FE-CBF1E04727CD}" type="datetimeFigureOut">
               <a:rPr lang="fr-FR" smtClean="0"/>
-              <a:t>27/11/2024</a:t>
+              <a:t>28/11/2024</a:t>
             </a:fld>
             <a:endParaRPr lang="fr-FR"/>
           </a:p>
@@ -457,7 +457,7 @@
           <a:p>
             <a:fld id="{4DF2D56A-9BCB-4C61-93FE-CBF1E04727CD}" type="datetimeFigureOut">
               <a:rPr lang="fr-FR" smtClean="0"/>
-              <a:t>27/11/2024</a:t>
+              <a:t>28/11/2024</a:t>
             </a:fld>
             <a:endParaRPr lang="fr-FR"/>
           </a:p>
@@ -665,7 +665,7 @@
           <a:p>
             <a:fld id="{4DF2D56A-9BCB-4C61-93FE-CBF1E04727CD}" type="datetimeFigureOut">
               <a:rPr lang="fr-FR" smtClean="0"/>
-              <a:t>27/11/2024</a:t>
+              <a:t>28/11/2024</a:t>
             </a:fld>
             <a:endParaRPr lang="fr-FR"/>
           </a:p>
@@ -863,7 +863,7 @@
           <a:p>
             <a:fld id="{4DF2D56A-9BCB-4C61-93FE-CBF1E04727CD}" type="datetimeFigureOut">
               <a:rPr lang="fr-FR" smtClean="0"/>
-              <a:t>27/11/2024</a:t>
+              <a:t>28/11/2024</a:t>
             </a:fld>
             <a:endParaRPr lang="fr-FR"/>
           </a:p>
@@ -1138,7 +1138,7 @@
           <a:p>
             <a:fld id="{4DF2D56A-9BCB-4C61-93FE-CBF1E04727CD}" type="datetimeFigureOut">
               <a:rPr lang="fr-FR" smtClean="0"/>
-              <a:t>27/11/2024</a:t>
+              <a:t>28/11/2024</a:t>
             </a:fld>
             <a:endParaRPr lang="fr-FR"/>
           </a:p>
@@ -1403,7 +1403,7 @@
           <a:p>
             <a:fld id="{4DF2D56A-9BCB-4C61-93FE-CBF1E04727CD}" type="datetimeFigureOut">
               <a:rPr lang="fr-FR" smtClean="0"/>
-              <a:t>27/11/2024</a:t>
+              <a:t>28/11/2024</a:t>
             </a:fld>
             <a:endParaRPr lang="fr-FR"/>
           </a:p>
@@ -1815,7 +1815,7 @@
           <a:p>
             <a:fld id="{4DF2D56A-9BCB-4C61-93FE-CBF1E04727CD}" type="datetimeFigureOut">
               <a:rPr lang="fr-FR" smtClean="0"/>
-              <a:t>27/11/2024</a:t>
+              <a:t>28/11/2024</a:t>
             </a:fld>
             <a:endParaRPr lang="fr-FR"/>
           </a:p>
@@ -1956,7 +1956,7 @@
           <a:p>
             <a:fld id="{4DF2D56A-9BCB-4C61-93FE-CBF1E04727CD}" type="datetimeFigureOut">
               <a:rPr lang="fr-FR" smtClean="0"/>
-              <a:t>27/11/2024</a:t>
+              <a:t>28/11/2024</a:t>
             </a:fld>
             <a:endParaRPr lang="fr-FR"/>
           </a:p>
@@ -2069,7 +2069,7 @@
           <a:p>
             <a:fld id="{4DF2D56A-9BCB-4C61-93FE-CBF1E04727CD}" type="datetimeFigureOut">
               <a:rPr lang="fr-FR" smtClean="0"/>
-              <a:t>27/11/2024</a:t>
+              <a:t>28/11/2024</a:t>
             </a:fld>
             <a:endParaRPr lang="fr-FR"/>
           </a:p>
@@ -2380,7 +2380,7 @@
           <a:p>
             <a:fld id="{4DF2D56A-9BCB-4C61-93FE-CBF1E04727CD}" type="datetimeFigureOut">
               <a:rPr lang="fr-FR" smtClean="0"/>
-              <a:t>27/11/2024</a:t>
+              <a:t>28/11/2024</a:t>
             </a:fld>
             <a:endParaRPr lang="fr-FR"/>
           </a:p>
@@ -2668,7 +2668,7 @@
           <a:p>
             <a:fld id="{4DF2D56A-9BCB-4C61-93FE-CBF1E04727CD}" type="datetimeFigureOut">
               <a:rPr lang="fr-FR" smtClean="0"/>
-              <a:t>27/11/2024</a:t>
+              <a:t>28/11/2024</a:t>
             </a:fld>
             <a:endParaRPr lang="fr-FR"/>
           </a:p>
@@ -2909,7 +2909,7 @@
           <a:p>
             <a:fld id="{4DF2D56A-9BCB-4C61-93FE-CBF1E04727CD}" type="datetimeFigureOut">
               <a:rPr lang="fr-FR" smtClean="0"/>
-              <a:t>27/11/2024</a:t>
+              <a:t>28/11/2024</a:t>
             </a:fld>
             <a:endParaRPr lang="fr-FR"/>
           </a:p>
@@ -4307,6 +4307,176 @@
           </a:p>
         </p:txBody>
       </p:sp>
+      <p:sp>
+        <p:nvSpPr>
+          <p:cNvPr id="3" name="ZoneTexte 2">
+            <a:extLst>
+              <a:ext uri="{FF2B5EF4-FFF2-40B4-BE49-F238E27FC236}">
+                <a16:creationId xmlns:a16="http://schemas.microsoft.com/office/drawing/2014/main" id="{C8ABEAA3-1B37-479D-878B-18570E5B59AE}"/>
+              </a:ext>
+            </a:extLst>
+          </p:cNvPr>
+          <p:cNvSpPr txBox="1"/>
+          <p:nvPr/>
+        </p:nvSpPr>
+        <p:spPr>
+          <a:xfrm>
+            <a:off x="7117975" y="909846"/>
+            <a:ext cx="3200399" cy="8125301"/>
+          </a:xfrm>
+          <a:prstGeom prst="rect">
+            <a:avLst/>
+          </a:prstGeom>
+          <a:noFill/>
+        </p:spPr>
+        <p:txBody>
+          <a:bodyPr wrap="square" rtlCol="0">
+            <a:spAutoFit/>
+          </a:bodyPr>
+          <a:lstStyle/>
+          <a:p>
+            <a:r>
+              <a:rPr lang="fr-FR" dirty="0"/>
+              <a:t>	             	__________</a:t>
+            </a:r>
+          </a:p>
+          <a:p>
+            <a:r>
+              <a:rPr lang="fr-FR" dirty="0"/>
+              <a:t>	                |                   |</a:t>
+            </a:r>
+          </a:p>
+          <a:p>
+            <a:r>
+              <a:rPr lang="fr-FR" dirty="0"/>
+              <a:t>	                |                B |</a:t>
+            </a:r>
+          </a:p>
+          <a:p>
+            <a:r>
+              <a:rPr lang="fr-FR" dirty="0"/>
+              <a:t>	                |                    |</a:t>
+            </a:r>
+          </a:p>
+          <a:p>
+            <a:r>
+              <a:rPr lang="fr-FR" dirty="0"/>
+              <a:t>_______________|      307	   |</a:t>
+            </a:r>
+          </a:p>
+          <a:p>
+            <a:r>
+              <a:rPr lang="fr-FR" dirty="0"/>
+              <a:t>|      B            |        |                    |</a:t>
+            </a:r>
+          </a:p>
+          <a:p>
+            <a:r>
+              <a:rPr lang="fr-FR" dirty="0"/>
+              <a:t>|      305        |307 |                    |</a:t>
+            </a:r>
+          </a:p>
+          <a:p>
+            <a:r>
+              <a:rPr lang="fr-FR" dirty="0"/>
+              <a:t>|     ___         |  Bis |              A   |</a:t>
+            </a:r>
+          </a:p>
+          <a:p>
+            <a:r>
+              <a:rPr lang="fr-FR" dirty="0"/>
+              <a:t>|        C |       |        |                    |</a:t>
+            </a:r>
+          </a:p>
+          <a:p>
+            <a:r>
+              <a:rPr lang="fr-FR" dirty="0"/>
+              <a:t>|_____ |___|____|_________|</a:t>
+            </a:r>
+          </a:p>
+          <a:p>
+            <a:endParaRPr lang="fr-FR" dirty="0"/>
+          </a:p>
+          <a:p>
+            <a:r>
+              <a:rPr lang="fr-FR" dirty="0"/>
+              <a:t>__________________________</a:t>
+            </a:r>
+          </a:p>
+          <a:p>
+            <a:r>
+              <a:rPr lang="fr-FR" dirty="0"/>
+              <a:t>|                           |                B     |</a:t>
+            </a:r>
+          </a:p>
+          <a:p>
+            <a:r>
+              <a:rPr lang="fr-FR" dirty="0"/>
+              <a:t>| C                     A|                     A|</a:t>
+            </a:r>
+          </a:p>
+          <a:p>
+            <a:r>
+              <a:rPr lang="fr-FR" dirty="0"/>
+              <a:t>|          306          |          308       |</a:t>
+            </a:r>
+          </a:p>
+          <a:p>
+            <a:r>
+              <a:rPr lang="fr-FR" dirty="0"/>
+              <a:t>|                _____|  C                   |</a:t>
+            </a:r>
+          </a:p>
+          <a:p>
+            <a:r>
+              <a:rPr lang="fr-FR" dirty="0"/>
+              <a:t>|                |         |                       |</a:t>
+            </a:r>
+          </a:p>
+          <a:p>
+            <a:r>
+              <a:rPr lang="fr-FR" dirty="0"/>
+              <a:t>|              B|306- |                       |</a:t>
+            </a:r>
+          </a:p>
+          <a:p>
+            <a:r>
+              <a:rPr lang="fr-FR" dirty="0"/>
+              <a:t>|                | 308  |                       |</a:t>
+            </a:r>
+          </a:p>
+          <a:p>
+            <a:r>
+              <a:rPr lang="fr-FR" dirty="0"/>
+              <a:t>|_______ | ____| __________|</a:t>
+            </a:r>
+          </a:p>
+          <a:p>
+            <a:endParaRPr lang="fr-FR" dirty="0"/>
+          </a:p>
+          <a:p>
+            <a:endParaRPr lang="fr-FR" dirty="0"/>
+          </a:p>
+          <a:p>
+            <a:endParaRPr lang="fr-FR" dirty="0"/>
+          </a:p>
+          <a:p>
+            <a:endParaRPr lang="fr-FR" dirty="0"/>
+          </a:p>
+          <a:p>
+            <a:endParaRPr lang="fr-FR" dirty="0"/>
+          </a:p>
+          <a:p>
+            <a:endParaRPr lang="fr-FR" dirty="0"/>
+          </a:p>
+          <a:p>
+            <a:endParaRPr lang="fr-FR" dirty="0"/>
+          </a:p>
+          <a:p>
+            <a:endParaRPr lang="fr-FR" dirty="0"/>
+          </a:p>
+        </p:txBody>
+      </p:sp>
     </p:spTree>
     <p:extLst>
       <p:ext uri="{BB962C8B-B14F-4D97-AF65-F5344CB8AC3E}">

</xml_diff>